<commit_message>
revise slides12w, edit slides12f, add draft slides13mw
</commit_message>
<xml_diff>
--- a/spring11/slides11/slides12f.pptx
+++ b/spring11/slides11/slides12f.pptx
@@ -6787,11 +6787,7 @@
             </a:r>
             <a:r>
               <a:rPr lang="en-US" dirty="0" smtClean="0"/>
-              <a:t> </a:t>
-            </a:r>
-            <a:r>
-              <a:rPr lang="en-US" dirty="0" smtClean="0"/>
-              <a:t>12F.</a:t>
+              <a:t> 12F.</a:t>
             </a:r>
             <a:fld id="{7886A709-CED2-48A3-8616-B2655C008ECB}" type="slidenum">
               <a:rPr lang="en-US" smtClean="0"/>
@@ -6887,22 +6883,7 @@
                 <a:uFillTx/>
                 <a:latin typeface="Comic Sans MS" pitchFamily="66" charset="0"/>
               </a:rPr>
-              <a:t>Albert R Meyer,           </a:t>
-            </a:r>
-            <a:r>
-              <a:rPr kumimoji="0" lang="en-US" sz="1200" b="0" i="0" u="none" strike="noStrike" kern="1200" cap="none" spc="0" normalizeH="0" baseline="0" noProof="0" dirty="0" smtClean="0">
-                <a:ln>
-                  <a:noFill/>
-                </a:ln>
-                <a:solidFill>
-                  <a:schemeClr val="tx1"/>
-                </a:solidFill>
-                <a:effectLst/>
-                <a:uLnTx/>
-                <a:uFillTx/>
-                <a:latin typeface="Comic Sans MS" pitchFamily="66" charset="0"/>
-              </a:rPr>
-              <a:t> April 29, 2011</a:t>
+              <a:t>Albert R Meyer,            April 29, 2011</a:t>
             </a:r>
             <a:endParaRPr kumimoji="0" lang="en-US" sz="1200" b="0" i="0" u="none" strike="noStrike" kern="1200" cap="none" spc="0" normalizeH="0" baseline="0" noProof="0" dirty="0">
               <a:ln>
@@ -12663,112 +12644,6 @@
               </a:solidFill>
             </a:endParaRPr>
           </a:p>
-          <a:p>
-            <a:pPr marL="0" indent="0" eaLnBrk="1" hangingPunct="1"/>
-            <a:r>
-              <a:rPr lang="en-US" dirty="0" smtClean="0"/>
-              <a:t>(</a:t>
-            </a:r>
-            <a:r>
-              <a:rPr lang="en-US" dirty="0" smtClean="0">
-                <a:solidFill>
-                  <a:srgbClr val="006600"/>
-                </a:solidFill>
-              </a:rPr>
-              <a:t>Sanity check:</a:t>
-            </a:r>
-          </a:p>
-          <a:p>
-            <a:pPr marL="0" indent="0" algn="ctr" eaLnBrk="1" hangingPunct="1"/>
-            <a:r>
-              <a:rPr lang="en-US" dirty="0" smtClean="0"/>
-              <a:t> </a:t>
-            </a:r>
-            <a:r>
-              <a:rPr lang="en-US" dirty="0" smtClean="0">
-                <a:solidFill>
-                  <a:srgbClr val="3333FF"/>
-                </a:solidFill>
-              </a:rPr>
-              <a:t>I</a:t>
-            </a:r>
-            <a:r>
-              <a:rPr lang="en-US" baseline="-25000" dirty="0" smtClean="0">
-                <a:solidFill>
-                  <a:srgbClr val="3333FF"/>
-                </a:solidFill>
-              </a:rPr>
-              <a:t>A</a:t>
-            </a:r>
-            <a:r>
-              <a:rPr lang="en-US" baseline="-25000" dirty="0" smtClean="0"/>
-              <a:t>  </a:t>
-            </a:r>
-            <a:r>
-              <a:rPr lang="en-US" dirty="0" smtClean="0"/>
-              <a:t>and </a:t>
-            </a:r>
-            <a:r>
-              <a:rPr lang="en-US" dirty="0" smtClean="0">
-                <a:solidFill>
-                  <a:srgbClr val="3333FF"/>
-                </a:solidFill>
-              </a:rPr>
-              <a:t>I</a:t>
-            </a:r>
-            <a:r>
-              <a:rPr lang="en-US" baseline="-25000" dirty="0" smtClean="0">
-                <a:solidFill>
-                  <a:srgbClr val="3333FF"/>
-                </a:solidFill>
-              </a:rPr>
-              <a:t>B</a:t>
-            </a:r>
-            <a:r>
-              <a:rPr lang="en-US" baseline="-25000" dirty="0" smtClean="0"/>
-              <a:t>  </a:t>
-            </a:r>
-            <a:r>
-              <a:rPr lang="en-US" dirty="0" smtClean="0"/>
-              <a:t>are independent </a:t>
-            </a:r>
-            <a:r>
-              <a:rPr lang="en-US" dirty="0" err="1" smtClean="0"/>
-              <a:t>iff</a:t>
-            </a:r>
-            <a:endParaRPr lang="en-US" dirty="0" smtClean="0"/>
-          </a:p>
-          <a:p>
-            <a:pPr marL="0" indent="0" algn="ctr" eaLnBrk="1" hangingPunct="1"/>
-            <a:r>
-              <a:rPr lang="en-US" dirty="0" smtClean="0"/>
-              <a:t> </a:t>
-            </a:r>
-            <a:r>
-              <a:rPr lang="en-US" dirty="0" smtClean="0">
-                <a:solidFill>
-                  <a:srgbClr val="3333FF"/>
-                </a:solidFill>
-              </a:rPr>
-              <a:t>A</a:t>
-            </a:r>
-            <a:r>
-              <a:rPr lang="en-US" dirty="0" smtClean="0"/>
-              <a:t> and </a:t>
-            </a:r>
-            <a:r>
-              <a:rPr lang="en-US" dirty="0" smtClean="0">
-                <a:solidFill>
-                  <a:srgbClr val="3333FF"/>
-                </a:solidFill>
-              </a:rPr>
-              <a:t>B</a:t>
-            </a:r>
-            <a:r>
-              <a:rPr lang="en-US" dirty="0" smtClean="0"/>
-              <a:t> are independent.)</a:t>
-            </a:r>
-          </a:p>
         </p:txBody>
       </p:sp>
       <p:graphicFrame>
@@ -12782,12 +12657,12 @@
           </p:nvPr>
         </p:nvGraphicFramePr>
         <p:xfrm>
-          <a:off x="912457" y="1624013"/>
-          <a:ext cx="7278706" cy="1980833"/>
+          <a:off x="488821" y="1641417"/>
+          <a:ext cx="8137142" cy="1999250"/>
         </p:xfrm>
         <a:graphic>
           <a:graphicData uri="http://schemas.openxmlformats.org/presentationml/2006/ole">
-            <p:oleObj spid="_x0000_s486402" name="Equation" r:id="rId4" imgW="1866600" imgH="507960" progId="Equation.DSMT4">
+            <p:oleObj spid="_x0000_s486402" name="Equation" r:id="rId4" imgW="2171700" imgH="533400" progId="Equation.DSMT4">
               <p:embed/>
             </p:oleObj>
           </a:graphicData>
@@ -12821,6 +12696,26 @@
           </a:p>
         </p:txBody>
       </p:sp>
+      <p:graphicFrame>
+        <p:nvGraphicFramePr>
+          <p:cNvPr id="486405" name="Object 4"/>
+          <p:cNvGraphicFramePr>
+            <a:graphicFrameLocks noChangeAspect="1"/>
+          </p:cNvGraphicFramePr>
+          <p:nvPr/>
+        </p:nvGraphicFramePr>
+        <p:xfrm>
+          <a:off x="1263650" y="3922713"/>
+          <a:ext cx="6559550" cy="1722437"/>
+        </p:xfrm>
+        <a:graphic>
+          <a:graphicData uri="http://schemas.openxmlformats.org/presentationml/2006/ole">
+            <p:oleObj spid="_x0000_s486405" name="Equation" r:id="rId5" imgW="1308100" imgH="342900" progId="Equation.DSMT4">
+              <p:embed/>
+            </p:oleObj>
+          </a:graphicData>
+        </a:graphic>
+      </p:graphicFrame>
     </p:spTree>
   </p:cSld>
   <p:clrMapOvr>
@@ -12850,7 +12745,7 @@
                             </p:stCondLst>
                             <p:childTnLst>
                               <p:par>
-                                <p:cTn id="5" presetID="1" presetClass="entr" presetSubtype="0" fill="hold" nodeType="clickEffect">
+                                <p:cTn id="5" presetID="22" presetClass="entr" presetSubtype="8" fill="hold" nodeType="clickEffect">
                                   <p:stCondLst>
                                     <p:cond delay="0"/>
                                   </p:stCondLst>
@@ -12863,11 +12758,7 @@
                                           </p:stCondLst>
                                         </p:cTn>
                                         <p:tgtEl>
-                                          <p:spTgt spid="155651">
-                                            <p:txEl>
-                                              <p:pRg st="4" end="4"/>
-                                            </p:txEl>
-                                          </p:spTgt>
+                                          <p:spTgt spid="8194"/>
                                         </p:tgtEl>
                                         <p:attrNameLst>
                                           <p:attrName>style.visibility</p:attrName>
@@ -12877,28 +12768,50 @@
                                         <p:strVal val="visible"/>
                                       </p:to>
                                     </p:set>
+                                    <p:animEffect transition="in" filter="wipe(left)">
+                                      <p:cBhvr>
+                                        <p:cTn id="7" dur="500"/>
+                                        <p:tgtEl>
+                                          <p:spTgt spid="8194"/>
+                                        </p:tgtEl>
+                                      </p:cBhvr>
+                                    </p:animEffect>
                                   </p:childTnLst>
                                 </p:cTn>
                               </p:par>
+                            </p:childTnLst>
+                          </p:cTn>
+                        </p:par>
+                      </p:childTnLst>
+                    </p:cTn>
+                  </p:par>
+                  <p:par>
+                    <p:cTn id="8" fill="hold">
+                      <p:stCondLst>
+                        <p:cond delay="indefinite"/>
+                      </p:stCondLst>
+                      <p:childTnLst>
+                        <p:par>
+                          <p:cTn id="9" fill="hold">
+                            <p:stCondLst>
+                              <p:cond delay="0"/>
+                            </p:stCondLst>
+                            <p:childTnLst>
                               <p:par>
-                                <p:cTn id="7" presetID="1" presetClass="entr" presetSubtype="0" fill="hold" nodeType="withEffect">
+                                <p:cTn id="10" presetID="10" presetClass="entr" presetSubtype="0" fill="hold" nodeType="clickEffect">
                                   <p:stCondLst>
                                     <p:cond delay="0"/>
                                   </p:stCondLst>
                                   <p:childTnLst>
                                     <p:set>
                                       <p:cBhvr>
-                                        <p:cTn id="8" dur="1" fill="hold">
+                                        <p:cTn id="11" dur="1" fill="hold">
                                           <p:stCondLst>
                                             <p:cond delay="0"/>
                                           </p:stCondLst>
                                         </p:cTn>
                                         <p:tgtEl>
-                                          <p:spTgt spid="155651">
-                                            <p:txEl>
-                                              <p:pRg st="5" end="5"/>
-                                            </p:txEl>
-                                          </p:spTgt>
+                                          <p:spTgt spid="486405"/>
                                         </p:tgtEl>
                                         <p:attrNameLst>
                                           <p:attrName>style.visibility</p:attrName>
@@ -12908,37 +12821,14 @@
                                         <p:strVal val="visible"/>
                                       </p:to>
                                     </p:set>
-                                  </p:childTnLst>
-                                </p:cTn>
-                              </p:par>
-                              <p:par>
-                                <p:cTn id="9" presetID="1" presetClass="entr" presetSubtype="0" fill="hold" nodeType="withEffect">
-                                  <p:stCondLst>
-                                    <p:cond delay="0"/>
-                                  </p:stCondLst>
-                                  <p:childTnLst>
-                                    <p:set>
+                                    <p:animEffect transition="in" filter="fade">
                                       <p:cBhvr>
-                                        <p:cTn id="10" dur="1" fill="hold">
-                                          <p:stCondLst>
-                                            <p:cond delay="0"/>
-                                          </p:stCondLst>
-                                        </p:cTn>
+                                        <p:cTn id="12" dur="500"/>
                                         <p:tgtEl>
-                                          <p:spTgt spid="155651">
-                                            <p:txEl>
-                                              <p:pRg st="6" end="6"/>
-                                            </p:txEl>
-                                          </p:spTgt>
+                                          <p:spTgt spid="486405"/>
                                         </p:tgtEl>
-                                        <p:attrNameLst>
-                                          <p:attrName>style.visibility</p:attrName>
-                                        </p:attrNameLst>
                                       </p:cBhvr>
-                                      <p:to>
-                                        <p:strVal val="visible"/>
-                                      </p:to>
-                                    </p:set>
+                                    </p:animEffect>
                                   </p:childTnLst>
                                 </p:cTn>
                               </p:par>
@@ -13002,8 +12892,8 @@
         </p:nvSpPr>
         <p:spPr>
           <a:xfrm>
-            <a:off x="1295400" y="1295400"/>
-            <a:ext cx="6553200" cy="4572000"/>
+            <a:off x="633588" y="1276584"/>
+            <a:ext cx="7538156" cy="4621859"/>
           </a:xfrm>
         </p:spPr>
         <p:txBody>
@@ -13026,8 +12916,20 @@
               <a:t>I</a:t>
             </a:r>
             <a:r>
+              <a:rPr lang="en-US" sz="6000" baseline="-25000" dirty="0" smtClean="0">
+                <a:solidFill>
+                  <a:srgbClr val="0000FF"/>
+                </a:solidFill>
+              </a:rPr>
+              <a:t>A</a:t>
+            </a:r>
+            <a:r>
               <a:rPr lang="en-US" sz="6000" dirty="0" smtClean="0"/>
-              <a:t>] = </a:t>
+              <a:t>] </a:t>
+            </a:r>
+            <a:r>
+              <a:rPr lang="en-US" sz="6000" dirty="0" smtClean="0"/>
+              <a:t>= </a:t>
             </a:r>
             <a:r>
               <a:rPr lang="en-US" sz="6000" dirty="0" smtClean="0">
@@ -13054,7 +12956,31 @@
                   <a:srgbClr val="0000FF"/>
                 </a:solidFill>
               </a:rPr>
-              <a:t>I=1</a:t>
+              <a:t>I</a:t>
+            </a:r>
+            <a:r>
+              <a:rPr lang="en-US" sz="6000" baseline="-25000" dirty="0" smtClean="0">
+                <a:solidFill>
+                  <a:srgbClr val="0000FF"/>
+                </a:solidFill>
+              </a:rPr>
+              <a:t>A</a:t>
+            </a:r>
+            <a:r>
+              <a:rPr lang="en-US" sz="6000" dirty="0" smtClean="0">
+                <a:solidFill>
+                  <a:srgbClr val="0000FF"/>
+                </a:solidFill>
+              </a:rPr>
+              <a:t>=</a:t>
+            </a:r>
+            <a:r>
+              <a:rPr lang="en-US" sz="6000" dirty="0" smtClean="0">
+                <a:solidFill>
+                  <a:srgbClr val="0000FF"/>
+                </a:solidFill>
+              </a:rPr>
+              <a:t>1</a:t>
             </a:r>
             <a:r>
               <a:rPr lang="en-US" sz="6000" dirty="0" smtClean="0"/>
@@ -13087,7 +13013,16 @@
                 </a:solidFill>
                 <a:sym typeface="Euclid Symbol"/>
               </a:rPr>
-              <a:t>          0</a:t>
+              <a:t>         </a:t>
+            </a:r>
+            <a:r>
+              <a:rPr lang="en-US" sz="6000" dirty="0" smtClean="0">
+                <a:solidFill>
+                  <a:srgbClr val="0000FF"/>
+                </a:solidFill>
+                <a:sym typeface="Euclid Symbol"/>
+              </a:rPr>
+              <a:t>   0</a:t>
             </a:r>
             <a:r>
               <a:rPr lang="en-US" sz="6000" dirty="0" smtClean="0">
@@ -13105,7 +13040,31 @@
                   <a:srgbClr val="0000FF"/>
                 </a:solidFill>
               </a:rPr>
-              <a:t>I=0</a:t>
+              <a:t>I</a:t>
+            </a:r>
+            <a:r>
+              <a:rPr lang="en-US" sz="6000" baseline="-25000" dirty="0" smtClean="0">
+                <a:solidFill>
+                  <a:srgbClr val="0000FF"/>
+                </a:solidFill>
+              </a:rPr>
+              <a:t>A</a:t>
+            </a:r>
+            <a:r>
+              <a:rPr lang="en-US" sz="6000" dirty="0" smtClean="0">
+                <a:solidFill>
+                  <a:srgbClr val="0000FF"/>
+                </a:solidFill>
+              </a:rPr>
+              <a:t>=</a:t>
+            </a:r>
+            <a:r>
+              <a:rPr lang="en-US" sz="6000" dirty="0" smtClean="0">
+                <a:solidFill>
+                  <a:srgbClr val="0000FF"/>
+                </a:solidFill>
+              </a:rPr>
+              <a:t>0</a:t>
             </a:r>
             <a:r>
               <a:rPr lang="en-US" sz="6000" dirty="0" smtClean="0"/>
@@ -13118,7 +13077,11 @@
             </a:pPr>
             <a:r>
               <a:rPr lang="en-US" sz="6000" dirty="0" smtClean="0"/>
-              <a:t>        = </a:t>
+              <a:t>       </a:t>
+            </a:r>
+            <a:r>
+              <a:rPr lang="en-US" sz="6000" dirty="0" smtClean="0"/>
+              <a:t>  = </a:t>
             </a:r>
             <a:r>
               <a:rPr lang="en-US" sz="6000" dirty="0" err="1" smtClean="0"/>
@@ -13133,16 +13096,75 @@
               <a:t>I</a:t>
             </a:r>
             <a:r>
+              <a:rPr lang="en-US" sz="6000" baseline="-25000" dirty="0" err="1" smtClean="0">
+                <a:solidFill>
+                  <a:srgbClr val="0000FF"/>
+                </a:solidFill>
+              </a:rPr>
+              <a:t>A</a:t>
+            </a:r>
+            <a:r>
               <a:rPr lang="en-US" sz="6000" dirty="0" smtClean="0">
                 <a:solidFill>
                   <a:srgbClr val="0000FF"/>
                 </a:solidFill>
               </a:rPr>
-              <a:t>=1</a:t>
+              <a:t>=</a:t>
+            </a:r>
+            <a:r>
+              <a:rPr lang="en-US" sz="6000" dirty="0" smtClean="0">
+                <a:solidFill>
+                  <a:srgbClr val="0000FF"/>
+                </a:solidFill>
+              </a:rPr>
+              <a:t>1</a:t>
             </a:r>
             <a:r>
               <a:rPr lang="en-US" sz="6000" dirty="0" smtClean="0"/>
               <a:t>}</a:t>
+            </a:r>
+          </a:p>
+          <a:p>
+            <a:pPr>
+              <a:buNone/>
+            </a:pPr>
+            <a:r>
+              <a:rPr lang="en-US" sz="6000" dirty="0" smtClean="0"/>
+              <a:t>         </a:t>
+            </a:r>
+            <a:r>
+              <a:rPr lang="en-US" sz="6000" dirty="0" smtClean="0"/>
+              <a:t>= </a:t>
+            </a:r>
+            <a:r>
+              <a:rPr lang="en-US" sz="6000" dirty="0" err="1" smtClean="0"/>
+              <a:t>Pr</a:t>
+            </a:r>
+            <a:r>
+              <a:rPr lang="en-US" sz="6000" dirty="0" err="1" smtClean="0"/>
+              <a:t>{</a:t>
+            </a:r>
+            <a:r>
+              <a:rPr lang="en-US" sz="6000" dirty="0" err="1" smtClean="0">
+                <a:solidFill>
+                  <a:srgbClr val="0000FF"/>
+                </a:solidFill>
+              </a:rPr>
+              <a:t>A</a:t>
+            </a:r>
+            <a:r>
+              <a:rPr lang="en-US" sz="6000" dirty="0" smtClean="0"/>
+              <a:t>}</a:t>
+            </a:r>
+            <a:endParaRPr lang="en-US" sz="6000" dirty="0" smtClean="0"/>
+          </a:p>
+          <a:p>
+            <a:pPr>
+              <a:buNone/>
+            </a:pPr>
+            <a:r>
+              <a:rPr lang="en-US" sz="6000" dirty="0" smtClean="0"/>
+              <a:t>        </a:t>
             </a:r>
             <a:endParaRPr lang="en-US" sz="6000" dirty="0"/>
           </a:p>
@@ -13160,8 +13182,8 @@
         </p:nvSpPr>
         <p:spPr>
           <a:xfrm>
-            <a:off x="1143000" y="152400"/>
-            <a:ext cx="7543800" cy="1066800"/>
+            <a:off x="1086558" y="152399"/>
+            <a:ext cx="8001000" cy="1108193"/>
           </a:xfrm>
         </p:spPr>
         <p:txBody>
@@ -13189,21 +13211,34 @@
               </a:rPr>
               <a:t>I</a:t>
             </a:r>
+            <a:r>
+              <a:rPr lang="en-US" sz="4400" baseline="-25000" dirty="0" smtClean="0">
+                <a:solidFill>
+                  <a:srgbClr val="0000FF"/>
+                </a:solidFill>
+              </a:rPr>
+              <a:t>A</a:t>
+            </a:r>
+            <a:endParaRPr lang="en-US" sz="4400" dirty="0" smtClean="0">
+              <a:solidFill>
+                <a:srgbClr val="0000FF"/>
+              </a:solidFill>
+            </a:endParaRPr>
           </a:p>
         </p:txBody>
       </p:sp>
       <p:grpSp>
         <p:nvGrpSpPr>
-          <p:cNvPr id="2" name="Group 9"/>
+          <p:cNvPr id="10" name="Group 9"/>
           <p:cNvGrpSpPr/>
           <p:nvPr/>
         </p:nvGrpSpPr>
         <p:grpSpPr>
           <a:xfrm>
-            <a:off x="1295400" y="1219200"/>
-            <a:ext cx="5410200" cy="3505200"/>
-            <a:chOff x="1295400" y="1219200"/>
-            <a:chExt cx="5410200" cy="3505200"/>
+            <a:off x="536223" y="1326445"/>
+            <a:ext cx="5108221" cy="4534371"/>
+            <a:chOff x="536223" y="1326445"/>
+            <a:chExt cx="5108221" cy="4534371"/>
           </a:xfrm>
         </p:grpSpPr>
         <p:sp>
@@ -13214,8 +13249,8 @@
           </p:nvSpPr>
           <p:spPr bwMode="auto">
             <a:xfrm>
-              <a:off x="2971800" y="3505200"/>
-              <a:ext cx="3733800" cy="1219200"/>
+              <a:off x="2541271" y="4608404"/>
+              <a:ext cx="3103173" cy="1252412"/>
             </a:xfrm>
             <a:prstGeom prst="rect">
               <a:avLst/>
@@ -13277,8 +13312,8 @@
           </p:nvSpPr>
           <p:spPr bwMode="auto">
             <a:xfrm>
-              <a:off x="1295400" y="1219200"/>
-              <a:ext cx="1752600" cy="1143000"/>
+              <a:off x="536223" y="1326445"/>
+              <a:ext cx="2186414" cy="1194740"/>
             </a:xfrm>
             <a:prstGeom prst="rect">
               <a:avLst/>
@@ -13464,21 +13499,30 @@
                             </p:childTnLst>
                           </p:cTn>
                         </p:par>
+                      </p:childTnLst>
+                    </p:cTn>
+                  </p:par>
+                  <p:par>
+                    <p:cTn id="8" fill="hold">
+                      <p:stCondLst>
+                        <p:cond delay="indefinite"/>
+                      </p:stCondLst>
+                      <p:childTnLst>
                         <p:par>
-                          <p:cTn id="8" fill="hold">
+                          <p:cTn id="9" fill="hold">
                             <p:stCondLst>
-                              <p:cond delay="1000"/>
+                              <p:cond delay="0"/>
                             </p:stCondLst>
                             <p:childTnLst>
                               <p:par>
-                                <p:cTn id="9" presetID="22" presetClass="entr" presetSubtype="8" fill="hold" nodeType="afterEffect">
+                                <p:cTn id="10" presetID="22" presetClass="entr" presetSubtype="8" fill="hold" nodeType="clickEffect">
                                   <p:stCondLst>
                                     <p:cond delay="0"/>
                                   </p:stCondLst>
                                   <p:childTnLst>
                                     <p:set>
                                       <p:cBhvr>
-                                        <p:cTn id="10" dur="1" fill="hold">
+                                        <p:cTn id="11" dur="1" fill="hold">
                                           <p:stCondLst>
                                             <p:cond delay="0"/>
                                           </p:stCondLst>
@@ -13500,7 +13544,7 @@
                                     </p:set>
                                     <p:animEffect transition="in" filter="wipe(left)">
                                       <p:cBhvr>
-                                        <p:cTn id="11" dur="1000"/>
+                                        <p:cTn id="12" dur="1000"/>
                                         <p:tgtEl>
                                           <p:spTgt spid="3">
                                             <p:txEl>
@@ -13516,21 +13560,30 @@
                             </p:childTnLst>
                           </p:cTn>
                         </p:par>
+                      </p:childTnLst>
+                    </p:cTn>
+                  </p:par>
+                  <p:par>
+                    <p:cTn id="13" fill="hold">
+                      <p:stCondLst>
+                        <p:cond delay="indefinite"/>
+                      </p:stCondLst>
+                      <p:childTnLst>
                         <p:par>
-                          <p:cTn id="12" fill="hold">
+                          <p:cTn id="14" fill="hold">
                             <p:stCondLst>
-                              <p:cond delay="2000"/>
+                              <p:cond delay="0"/>
                             </p:stCondLst>
                             <p:childTnLst>
                               <p:par>
-                                <p:cTn id="13" presetID="9" presetClass="entr" presetSubtype="0" fill="hold" nodeType="afterEffect">
+                                <p:cTn id="15" presetID="9" presetClass="entr" presetSubtype="0" fill="hold" nodeType="clickEffect">
                                   <p:stCondLst>
                                     <p:cond delay="0"/>
                                   </p:stCondLst>
                                   <p:childTnLst>
                                     <p:set>
                                       <p:cBhvr>
-                                        <p:cTn id="14" dur="1" fill="hold">
+                                        <p:cTn id="16" dur="1" fill="hold">
                                           <p:stCondLst>
                                             <p:cond delay="0"/>
                                           </p:stCondLst>
@@ -13552,7 +13605,7 @@
                                     </p:set>
                                     <p:animEffect transition="in" filter="dissolve">
                                       <p:cBhvr>
-                                        <p:cTn id="15" dur="500"/>
+                                        <p:cTn id="17" dur="500"/>
                                         <p:tgtEl>
                                           <p:spTgt spid="3">
                                             <p:txEl>
@@ -13568,27 +13621,97 @@
                             </p:childTnLst>
                           </p:cTn>
                         </p:par>
+                      </p:childTnLst>
+                    </p:cTn>
+                  </p:par>
+                  <p:par>
+                    <p:cTn id="18" fill="hold">
+                      <p:stCondLst>
+                        <p:cond delay="indefinite"/>
+                      </p:stCondLst>
+                      <p:childTnLst>
                         <p:par>
-                          <p:cTn id="16" fill="hold">
+                          <p:cTn id="19" fill="hold">
                             <p:stCondLst>
-                              <p:cond delay="2500"/>
+                              <p:cond delay="0"/>
                             </p:stCondLst>
                             <p:childTnLst>
                               <p:par>
-                                <p:cTn id="17" presetID="15" presetClass="entr" presetSubtype="0" fill="hold" nodeType="afterEffect">
+                                <p:cTn id="20" presetID="9" presetClass="entr" presetSubtype="0" fill="hold" nodeType="clickEffect">
                                   <p:stCondLst>
                                     <p:cond delay="0"/>
                                   </p:stCondLst>
                                   <p:childTnLst>
                                     <p:set>
                                       <p:cBhvr>
-                                        <p:cTn id="18" dur="1" fill="hold">
+                                        <p:cTn id="21" dur="1" fill="hold">
                                           <p:stCondLst>
                                             <p:cond delay="0"/>
                                           </p:stCondLst>
                                         </p:cTn>
                                         <p:tgtEl>
-                                          <p:spTgt spid="2"/>
+                                          <p:spTgt spid="3">
+                                            <p:txEl>
+                                              <p:pRg st="3" end="3"/>
+                                            </p:txEl>
+                                          </p:spTgt>
+                                        </p:tgtEl>
+                                        <p:attrNameLst>
+                                          <p:attrName>style.visibility</p:attrName>
+                                        </p:attrNameLst>
+                                      </p:cBhvr>
+                                      <p:to>
+                                        <p:strVal val="visible"/>
+                                      </p:to>
+                                    </p:set>
+                                    <p:animEffect transition="in" filter="dissolve">
+                                      <p:cBhvr>
+                                        <p:cTn id="22" dur="500"/>
+                                        <p:tgtEl>
+                                          <p:spTgt spid="3">
+                                            <p:txEl>
+                                              <p:pRg st="3" end="3"/>
+                                            </p:txEl>
+                                          </p:spTgt>
+                                        </p:tgtEl>
+                                      </p:cBhvr>
+                                    </p:animEffect>
+                                  </p:childTnLst>
+                                </p:cTn>
+                              </p:par>
+                            </p:childTnLst>
+                          </p:cTn>
+                        </p:par>
+                      </p:childTnLst>
+                    </p:cTn>
+                  </p:par>
+                  <p:par>
+                    <p:cTn id="23" fill="hold">
+                      <p:stCondLst>
+                        <p:cond delay="indefinite"/>
+                      </p:stCondLst>
+                      <p:childTnLst>
+                        <p:par>
+                          <p:cTn id="24" fill="hold">
+                            <p:stCondLst>
+                              <p:cond delay="0"/>
+                            </p:stCondLst>
+                            <p:childTnLst>
+                              <p:par>
+                                <p:cTn id="25" presetID="15" presetClass="entr" presetSubtype="0" fill="hold" nodeType="clickEffect">
+                                  <p:stCondLst>
+                                    <p:cond delay="0"/>
+                                  </p:stCondLst>
+                                  <p:childTnLst>
+                                    <p:set>
+                                      <p:cBhvr>
+                                        <p:cTn id="26" dur="1" fill="hold">
+                                          <p:stCondLst>
+                                            <p:cond delay="0"/>
+                                          </p:stCondLst>
+                                        </p:cTn>
+                                        <p:tgtEl>
+                                          <p:spTgt spid="10"/>
                                         </p:tgtEl>
                                         <p:attrNameLst>
                                           <p:attrName>style.visibility</p:attrName>
@@ -13600,9 +13723,9 @@
                                     </p:set>
                                     <p:anim calcmode="lin" valueType="num">
                                       <p:cBhvr>
-                                        <p:cTn id="19" dur="1000" fill="hold"/>
+                                        <p:cTn id="27" dur="1000" fill="hold"/>
                                         <p:tgtEl>
-                                          <p:spTgt spid="2"/>
+                                          <p:spTgt spid="10"/>
                                         </p:tgtEl>
                                         <p:attrNameLst>
                                           <p:attrName>ppt_w</p:attrName>
@@ -13623,9 +13746,9 @@
                                     </p:anim>
                                     <p:anim calcmode="lin" valueType="num">
                                       <p:cBhvr>
-                                        <p:cTn id="20" dur="1000" fill="hold"/>
+                                        <p:cTn id="28" dur="1000" fill="hold"/>
                                         <p:tgtEl>
-                                          <p:spTgt spid="2"/>
+                                          <p:spTgt spid="10"/>
                                         </p:tgtEl>
                                         <p:attrNameLst>
                                           <p:attrName>ppt_h</p:attrName>
@@ -13646,9 +13769,9 @@
                                     </p:anim>
                                     <p:anim calcmode="lin" valueType="num">
                                       <p:cBhvr>
-                                        <p:cTn id="21" dur="1000" fill="hold"/>
+                                        <p:cTn id="29" dur="1000" fill="hold"/>
                                         <p:tgtEl>
-                                          <p:spTgt spid="2"/>
+                                          <p:spTgt spid="10"/>
                                         </p:tgtEl>
                                         <p:attrNameLst>
                                           <p:attrName>ppt_x</p:attrName>
@@ -13669,9 +13792,9 @@
                                     </p:anim>
                                     <p:anim calcmode="lin" valueType="num">
                                       <p:cBhvr>
-                                        <p:cTn id="22" dur="1000" fill="hold"/>
+                                        <p:cTn id="30" dur="1000" fill="hold"/>
                                         <p:tgtEl>
-                                          <p:spTgt spid="2"/>
+                                          <p:spTgt spid="10"/>
                                         </p:tgtEl>
                                         <p:attrNameLst>
                                           <p:attrName>ppt_y</p:attrName>
@@ -14586,8 +14709,8 @@
         </p:nvSpPr>
         <p:spPr>
           <a:xfrm>
-            <a:off x="543830" y="1295400"/>
-            <a:ext cx="8099418" cy="2123658"/>
+            <a:off x="268968" y="1295400"/>
+            <a:ext cx="8686818" cy="2123658"/>
           </a:xfrm>
           <a:prstGeom prst="rect">
             <a:avLst/>
@@ -14604,7 +14727,25 @@
               <a:rPr lang="en-US" sz="4400" i="0" dirty="0" smtClean="0">
                 <a:latin typeface="+mj-lt"/>
               </a:rPr>
-              <a:t>we know how to </a:t>
+              <a:t>we</a:t>
+            </a:r>
+            <a:r>
+              <a:rPr lang="en-US" sz="4400" i="0" dirty="0" smtClean="0">
+                <a:latin typeface="+mj-lt"/>
+              </a:rPr>
+              <a:t> could perturb </a:t>
+            </a:r>
+            <a:r>
+              <a:rPr lang="en-US" sz="4400" dirty="0" smtClean="0">
+                <a:latin typeface="+mj-lt"/>
+              </a:rPr>
+              <a:t>to</a:t>
+            </a:r>
+            <a:r>
+              <a:rPr lang="en-US" sz="4400" i="0" dirty="0" smtClean="0">
+                <a:latin typeface="+mj-lt"/>
+              </a:rPr>
+              <a:t> </a:t>
             </a:r>
             <a:r>
               <a:rPr lang="en-US" sz="4400" dirty="0" smtClean="0">
@@ -16333,12 +16474,12 @@
           <p:nvPr/>
         </p:nvGraphicFramePr>
         <p:xfrm>
-          <a:off x="452438" y="2863850"/>
-          <a:ext cx="8208962" cy="2451100"/>
+          <a:off x="420688" y="2863850"/>
+          <a:ext cx="8272462" cy="2451100"/>
         </p:xfrm>
         <a:graphic>
           <a:graphicData uri="http://schemas.openxmlformats.org/presentationml/2006/ole">
-            <p:oleObj spid="_x0000_s210946" name="Equation" r:id="rId4" imgW="1663700" imgH="495300" progId="Equation.DSMT4">
+            <p:oleObj spid="_x0000_s210946" name="Equation" r:id="rId4" imgW="1676400" imgH="495300" progId="Equation.DSMT4">
               <p:embed/>
             </p:oleObj>
           </a:graphicData>
@@ -22499,7 +22640,7 @@
             <a:r>
               <a:rPr lang="en-US" sz="5400" i="0" dirty="0" smtClean="0">
                 <a:solidFill>
-                  <a:srgbClr val="008000"/>
+                  <a:srgbClr val="0000FF"/>
                 </a:solidFill>
                 <a:latin typeface="+mj-lt"/>
               </a:rPr>
@@ -22533,7 +22674,7 @@
             <a:r>
               <a:rPr lang="en-US" sz="5400" i="0" dirty="0" smtClean="0">
                 <a:solidFill>
-                  <a:srgbClr val="008000"/>
+                  <a:srgbClr val="0000FF"/>
                 </a:solidFill>
                 <a:latin typeface="+mj-lt"/>
               </a:rPr>
@@ -28839,7 +28980,7 @@
                             </p:stCondLst>
                             <p:childTnLst>
                               <p:par>
-                                <p:cTn id="5" presetID="22" presetClass="entr" presetSubtype="1" fill="hold" nodeType="clickEffect">
+                                <p:cTn id="5" presetID="1" presetClass="entr" presetSubtype="0" fill="hold" grpId="0" nodeType="clickEffect">
                                   <p:stCondLst>
                                     <p:cond delay="0"/>
                                   </p:stCondLst>
@@ -28847,6 +28988,51 @@
                                     <p:set>
                                       <p:cBhvr>
                                         <p:cTn id="6" dur="1" fill="hold">
+                                          <p:stCondLst>
+                                            <p:cond delay="0"/>
+                                          </p:stCondLst>
+                                        </p:cTn>
+                                        <p:tgtEl>
+                                          <p:spTgt spid="6"/>
+                                        </p:tgtEl>
+                                        <p:attrNameLst>
+                                          <p:attrName>style.visibility</p:attrName>
+                                        </p:attrNameLst>
+                                      </p:cBhvr>
+                                      <p:to>
+                                        <p:strVal val="visible"/>
+                                      </p:to>
+                                    </p:set>
+                                  </p:childTnLst>
+                                </p:cTn>
+                              </p:par>
+                            </p:childTnLst>
+                          </p:cTn>
+                        </p:par>
+                      </p:childTnLst>
+                    </p:cTn>
+                  </p:par>
+                  <p:par>
+                    <p:cTn id="7" fill="hold">
+                      <p:stCondLst>
+                        <p:cond delay="indefinite"/>
+                      </p:stCondLst>
+                      <p:childTnLst>
+                        <p:par>
+                          <p:cTn id="8" fill="hold">
+                            <p:stCondLst>
+                              <p:cond delay="0"/>
+                            </p:stCondLst>
+                            <p:childTnLst>
+                              <p:par>
+                                <p:cTn id="9" presetID="22" presetClass="entr" presetSubtype="1" fill="hold" nodeType="clickEffect">
+                                  <p:stCondLst>
+                                    <p:cond delay="0"/>
+                                  </p:stCondLst>
+                                  <p:childTnLst>
+                                    <p:set>
+                                      <p:cBhvr>
+                                        <p:cTn id="10" dur="1" fill="hold">
                                           <p:stCondLst>
                                             <p:cond delay="0"/>
                                           </p:stCondLst>
@@ -28864,7 +29050,7 @@
                                     </p:set>
                                     <p:animEffect transition="in" filter="wipe(up)">
                                       <p:cBhvr>
-                                        <p:cTn id="7" dur="1000"/>
+                                        <p:cTn id="11" dur="1000"/>
                                         <p:tgtEl>
                                           <p:spTgt spid="198659"/>
                                         </p:tgtEl>
@@ -28880,26 +29066,26 @@
                     </p:cTn>
                   </p:par>
                   <p:par>
-                    <p:cTn id="8" fill="hold">
+                    <p:cTn id="12" fill="hold">
                       <p:stCondLst>
                         <p:cond delay="indefinite"/>
                       </p:stCondLst>
                       <p:childTnLst>
                         <p:par>
-                          <p:cTn id="9" fill="hold">
+                          <p:cTn id="13" fill="hold">
                             <p:stCondLst>
                               <p:cond delay="0"/>
                             </p:stCondLst>
                             <p:childTnLst>
                               <p:par>
-                                <p:cTn id="10" presetID="15" presetClass="entr" presetSubtype="0" fill="hold" nodeType="clickEffect">
+                                <p:cTn id="14" presetID="15" presetClass="entr" presetSubtype="0" fill="hold" nodeType="clickEffect">
                                   <p:stCondLst>
                                     <p:cond delay="0"/>
                                   </p:stCondLst>
                                   <p:childTnLst>
                                     <p:set>
                                       <p:cBhvr>
-                                        <p:cTn id="11" dur="1" fill="hold">
+                                        <p:cTn id="15" dur="1" fill="hold">
                                           <p:stCondLst>
                                             <p:cond delay="0"/>
                                           </p:stCondLst>
@@ -28917,7 +29103,7 @@
                                     </p:set>
                                     <p:anim calcmode="lin" valueType="num">
                                       <p:cBhvr>
-                                        <p:cTn id="12" dur="1000" fill="hold"/>
+                                        <p:cTn id="16" dur="1000" fill="hold"/>
                                         <p:tgtEl>
                                           <p:spTgt spid="12"/>
                                         </p:tgtEl>
@@ -28940,7 +29126,7 @@
                                     </p:anim>
                                     <p:anim calcmode="lin" valueType="num">
                                       <p:cBhvr>
-                                        <p:cTn id="13" dur="1000" fill="hold"/>
+                                        <p:cTn id="17" dur="1000" fill="hold"/>
                                         <p:tgtEl>
                                           <p:spTgt spid="12"/>
                                         </p:tgtEl>
@@ -28963,7 +29149,7 @@
                                     </p:anim>
                                     <p:anim calcmode="lin" valueType="num">
                                       <p:cBhvr>
-                                        <p:cTn id="14" dur="1000" fill="hold"/>
+                                        <p:cTn id="18" dur="1000" fill="hold"/>
                                         <p:tgtEl>
                                           <p:spTgt spid="12"/>
                                         </p:tgtEl>
@@ -28986,7 +29172,7 @@
                                     </p:anim>
                                     <p:anim calcmode="lin" valueType="num">
                                       <p:cBhvr>
-                                        <p:cTn id="15" dur="1000" fill="hold"/>
+                                        <p:cTn id="19" dur="1000" fill="hold"/>
                                         <p:tgtEl>
                                           <p:spTgt spid="12"/>
                                         </p:tgtEl>
@@ -29037,6 +29223,9 @@
         </p:cTn>
       </p:par>
     </p:tnLst>
+    <p:bldLst>
+      <p:bldP spid="6" grpId="0"/>
+    </p:bldLst>
   </p:timing>
 </p:sld>
 </file>

</xml_diff>